<commit_message>
relpace create -f with apply -f in ppt
</commit_message>
<xml_diff>
--- a/day-3/Using Kubernetes Day 3.pptx
+++ b/day-3/Using Kubernetes Day 3.pptx
@@ -15413,7 +15413,7 @@
               </a:lnSpc>
             </a:pPr>
             <a:r>
-              <a:rPr lang="en-US" sz="2200" b="0" i="1" strike="noStrike" spc="-1">
+              <a:rPr lang="en-US" sz="2200" b="0" i="1" strike="noStrike" spc="-1" dirty="0">
                 <a:solidFill>
                   <a:srgbClr val="1F4E79"/>
                 </a:solidFill>
@@ -15428,7 +15428,7 @@
               <a:t># Create a service from a file.</a:t>
             </a:r>
             <a:r>
-              <a:rPr lang="en-US" sz="2400" b="0" strike="noStrike" spc="-1">
+              <a:rPr lang="en-US" sz="2400" b="0" strike="noStrike" spc="-1" dirty="0">
                 <a:solidFill>
                   <a:srgbClr val="24292E"/>
                 </a:solidFill>
@@ -15442,7 +15442,7 @@
               </a:rPr>
               <a:t> </a:t>
             </a:r>
-            <a:endParaRPr lang="en-US" sz="1800" b="0" strike="noStrike" spc="-1">
+            <a:endParaRPr lang="en-US" sz="1800" b="0" strike="noStrike" spc="-1" dirty="0">
               <a:solidFill>
                 <a:srgbClr val="000000"/>
               </a:solidFill>
@@ -15461,7 +15461,7 @@
               </a:lnSpc>
             </a:pPr>
             <a:r>
-              <a:rPr lang="en-US" sz="2200" b="1" strike="noStrike" spc="-1">
+              <a:rPr lang="en-US" sz="2200" b="1" strike="noStrike" spc="-1" dirty="0">
                 <a:solidFill>
                   <a:srgbClr val="000000"/>
                 </a:solidFill>
@@ -15473,10 +15473,70 @@
                 <a:latin typeface="Courier New"/>
                 <a:ea typeface="DejaVu Sans"/>
               </a:rPr>
-              <a:t>$ kubectl create –f </a:t>
-            </a:r>
-            <a:r>
-              <a:rPr lang="en-US" sz="2200" b="1" strike="noStrike" spc="-1">
+              <a:t>$ </a:t>
+            </a:r>
+            <a:r>
+              <a:rPr lang="en-US" sz="2200" b="1" strike="noStrike" spc="-1" dirty="0" err="1">
+                <a:solidFill>
+                  <a:srgbClr val="000000"/>
+                </a:solidFill>
+                <a:uFill>
+                  <a:solidFill>
+                    <a:srgbClr val="FFFFFF"/>
+                  </a:solidFill>
+                </a:uFill>
+                <a:latin typeface="Courier New"/>
+                <a:ea typeface="DejaVu Sans"/>
+              </a:rPr>
+              <a:t>kubectl</a:t>
+            </a:r>
+            <a:r>
+              <a:rPr lang="en-US" sz="2200" b="1" strike="noStrike" spc="-1" dirty="0">
+                <a:solidFill>
+                  <a:srgbClr val="000000"/>
+                </a:solidFill>
+                <a:uFill>
+                  <a:solidFill>
+                    <a:srgbClr val="FFFFFF"/>
+                  </a:solidFill>
+                </a:uFill>
+                <a:latin typeface="Courier New"/>
+                <a:ea typeface="DejaVu Sans"/>
+              </a:rPr>
+              <a:t> </a:t>
+            </a:r>
+            <a:r>
+              <a:rPr lang="en-US" sz="2200" b="1" spc="-1" dirty="0">
+                <a:solidFill>
+                  <a:srgbClr val="000000"/>
+                </a:solidFill>
+                <a:uFill>
+                  <a:solidFill>
+                    <a:srgbClr val="FFFFFF"/>
+                  </a:solidFill>
+                </a:uFill>
+                <a:latin typeface="Courier New"/>
+                <a:ea typeface="DejaVu Sans"/>
+              </a:rPr>
+              <a:t>apply </a:t>
+            </a:r>
+            <a:r>
+              <a:rPr lang="en-US" sz="2200" b="1" strike="noStrike" spc="-1" dirty="0">
+                <a:solidFill>
+                  <a:srgbClr val="000000"/>
+                </a:solidFill>
+                <a:uFill>
+                  <a:solidFill>
+                    <a:srgbClr val="FFFFFF"/>
+                  </a:solidFill>
+                </a:uFill>
+                <a:latin typeface="Courier New"/>
+                <a:ea typeface="DejaVu Sans"/>
+              </a:rPr>
+              <a:t>–f </a:t>
+            </a:r>
+            <a:r>
+              <a:rPr lang="en-US" sz="2200" b="1" strike="noStrike" spc="-1" dirty="0">
                 <a:solidFill>
                   <a:srgbClr val="843C0B"/>
                 </a:solidFill>
@@ -15488,9 +15548,24 @@
                 <a:latin typeface="Courier New"/>
                 <a:ea typeface="DejaVu Sans"/>
               </a:rPr>
-              <a:t>my-service.yaml</a:t>
-            </a:r>
-            <a:endParaRPr lang="en-US" sz="1800" b="0" strike="noStrike" spc="-1">
+              <a:t>my-</a:t>
+            </a:r>
+            <a:r>
+              <a:rPr lang="en-US" sz="2200" b="1" strike="noStrike" spc="-1" dirty="0" err="1">
+                <a:solidFill>
+                  <a:srgbClr val="843C0B"/>
+                </a:solidFill>
+                <a:uFill>
+                  <a:solidFill>
+                    <a:srgbClr val="FFFFFF"/>
+                  </a:solidFill>
+                </a:uFill>
+                <a:latin typeface="Courier New"/>
+                <a:ea typeface="DejaVu Sans"/>
+              </a:rPr>
+              <a:t>service.yaml</a:t>
+            </a:r>
+            <a:endParaRPr lang="en-US" sz="1800" b="0" strike="noStrike" spc="-1" dirty="0">
               <a:solidFill>
                 <a:srgbClr val="000000"/>
               </a:solidFill>
@@ -25940,7 +26015,7 @@
               </a:lnSpc>
             </a:pPr>
             <a:r>
-              <a:rPr lang="en-US" sz="1800" b="1" strike="noStrike" spc="-1">
+              <a:rPr lang="en-US" sz="1800" b="1" strike="noStrike" spc="-1" dirty="0">
                 <a:solidFill>
                   <a:srgbClr val="000000"/>
                 </a:solidFill>
@@ -25952,10 +26027,70 @@
                 <a:latin typeface="Courier New"/>
                 <a:ea typeface="DejaVu Sans"/>
               </a:rPr>
-              <a:t>$ kubectl create –f </a:t>
-            </a:r>
-            <a:r>
-              <a:rPr lang="en-US" sz="1800" b="1" strike="noStrike" spc="-1">
+              <a:t>$ </a:t>
+            </a:r>
+            <a:r>
+              <a:rPr lang="en-US" sz="1800" b="1" strike="noStrike" spc="-1" dirty="0" err="1">
+                <a:solidFill>
+                  <a:srgbClr val="000000"/>
+                </a:solidFill>
+                <a:uFill>
+                  <a:solidFill>
+                    <a:srgbClr val="FFFFFF"/>
+                  </a:solidFill>
+                </a:uFill>
+                <a:latin typeface="Courier New"/>
+                <a:ea typeface="DejaVu Sans"/>
+              </a:rPr>
+              <a:t>kubectl</a:t>
+            </a:r>
+            <a:r>
+              <a:rPr lang="en-US" sz="1800" b="1" strike="noStrike" spc="-1" dirty="0">
+                <a:solidFill>
+                  <a:srgbClr val="000000"/>
+                </a:solidFill>
+                <a:uFill>
+                  <a:solidFill>
+                    <a:srgbClr val="FFFFFF"/>
+                  </a:solidFill>
+                </a:uFill>
+                <a:latin typeface="Courier New"/>
+                <a:ea typeface="DejaVu Sans"/>
+              </a:rPr>
+              <a:t> </a:t>
+            </a:r>
+            <a:r>
+              <a:rPr lang="en-US" b="1" spc="-1" dirty="0">
+                <a:solidFill>
+                  <a:srgbClr val="000000"/>
+                </a:solidFill>
+                <a:uFill>
+                  <a:solidFill>
+                    <a:srgbClr val="FFFFFF"/>
+                  </a:solidFill>
+                </a:uFill>
+                <a:latin typeface="Courier New"/>
+                <a:ea typeface="DejaVu Sans"/>
+              </a:rPr>
+              <a:t>apply </a:t>
+            </a:r>
+            <a:r>
+              <a:rPr lang="en-US" sz="1800" b="1" strike="noStrike" spc="-1" dirty="0">
+                <a:solidFill>
+                  <a:srgbClr val="000000"/>
+                </a:solidFill>
+                <a:uFill>
+                  <a:solidFill>
+                    <a:srgbClr val="FFFFFF"/>
+                  </a:solidFill>
+                </a:uFill>
+                <a:latin typeface="Courier New"/>
+                <a:ea typeface="DejaVu Sans"/>
+              </a:rPr>
+              <a:t>–f </a:t>
+            </a:r>
+            <a:r>
+              <a:rPr lang="en-US" sz="1800" b="1" strike="noStrike" spc="-1" dirty="0">
                 <a:solidFill>
                   <a:srgbClr val="843C0B"/>
                 </a:solidFill>
@@ -25967,9 +26102,24 @@
                 <a:latin typeface="Courier New"/>
                 <a:ea typeface="DejaVu Sans"/>
               </a:rPr>
-              <a:t>my-config.yaml</a:t>
-            </a:r>
-            <a:endParaRPr lang="en-US" sz="1800" b="0" strike="noStrike" spc="-1">
+              <a:t>my-</a:t>
+            </a:r>
+            <a:r>
+              <a:rPr lang="en-US" sz="1800" b="1" strike="noStrike" spc="-1" dirty="0" err="1">
+                <a:solidFill>
+                  <a:srgbClr val="843C0B"/>
+                </a:solidFill>
+                <a:uFill>
+                  <a:solidFill>
+                    <a:srgbClr val="FFFFFF"/>
+                  </a:solidFill>
+                </a:uFill>
+                <a:latin typeface="Courier New"/>
+                <a:ea typeface="DejaVu Sans"/>
+              </a:rPr>
+              <a:t>config.yaml</a:t>
+            </a:r>
+            <a:endParaRPr lang="en-US" sz="1800" b="0" strike="noStrike" spc="-1" dirty="0">
               <a:solidFill>
                 <a:srgbClr val="000000"/>
               </a:solidFill>
@@ -25988,7 +26138,7 @@
               </a:lnSpc>
             </a:pPr>
             <a:r>
-              <a:rPr lang="en-US" sz="1800" b="1" strike="noStrike" spc="-1">
+              <a:rPr lang="en-US" sz="1800" b="1" strike="noStrike" spc="-1" dirty="0">
                 <a:solidFill>
                   <a:srgbClr val="000000"/>
                 </a:solidFill>
@@ -26000,9 +26150,99 @@
                 <a:latin typeface="Courier New"/>
                 <a:ea typeface="DejaVu Sans"/>
               </a:rPr>
-              <a:t>$ kubectl create configmap special-config --from-literal=special.how=very</a:t>
-            </a:r>
-            <a:endParaRPr lang="en-US" sz="1800" b="0" strike="noStrike" spc="-1">
+              <a:t>$ </a:t>
+            </a:r>
+            <a:r>
+              <a:rPr lang="en-US" sz="1800" b="1" strike="noStrike" spc="-1" dirty="0" err="1">
+                <a:solidFill>
+                  <a:srgbClr val="000000"/>
+                </a:solidFill>
+                <a:uFill>
+                  <a:solidFill>
+                    <a:srgbClr val="FFFFFF"/>
+                  </a:solidFill>
+                </a:uFill>
+                <a:latin typeface="Courier New"/>
+                <a:ea typeface="DejaVu Sans"/>
+              </a:rPr>
+              <a:t>kubectl</a:t>
+            </a:r>
+            <a:r>
+              <a:rPr lang="en-US" sz="1800" b="1" strike="noStrike" spc="-1" dirty="0">
+                <a:solidFill>
+                  <a:srgbClr val="000000"/>
+                </a:solidFill>
+                <a:uFill>
+                  <a:solidFill>
+                    <a:srgbClr val="FFFFFF"/>
+                  </a:solidFill>
+                </a:uFill>
+                <a:latin typeface="Courier New"/>
+                <a:ea typeface="DejaVu Sans"/>
+              </a:rPr>
+              <a:t> create </a:t>
+            </a:r>
+            <a:r>
+              <a:rPr lang="en-US" sz="1800" b="1" strike="noStrike" spc="-1" dirty="0" err="1">
+                <a:solidFill>
+                  <a:srgbClr val="000000"/>
+                </a:solidFill>
+                <a:uFill>
+                  <a:solidFill>
+                    <a:srgbClr val="FFFFFF"/>
+                  </a:solidFill>
+                </a:uFill>
+                <a:latin typeface="Courier New"/>
+                <a:ea typeface="DejaVu Sans"/>
+              </a:rPr>
+              <a:t>configmap</a:t>
+            </a:r>
+            <a:r>
+              <a:rPr lang="en-US" sz="1800" b="1" strike="noStrike" spc="-1" dirty="0">
+                <a:solidFill>
+                  <a:srgbClr val="000000"/>
+                </a:solidFill>
+                <a:uFill>
+                  <a:solidFill>
+                    <a:srgbClr val="FFFFFF"/>
+                  </a:solidFill>
+                </a:uFill>
+                <a:latin typeface="Courier New"/>
+                <a:ea typeface="DejaVu Sans"/>
+              </a:rPr>
+              <a:t> special-config --from-literal=</a:t>
+            </a:r>
+            <a:r>
+              <a:rPr lang="en-US" sz="1800" b="1" strike="noStrike" spc="-1" dirty="0" err="1">
+                <a:solidFill>
+                  <a:srgbClr val="000000"/>
+                </a:solidFill>
+                <a:uFill>
+                  <a:solidFill>
+                    <a:srgbClr val="FFFFFF"/>
+                  </a:solidFill>
+                </a:uFill>
+                <a:latin typeface="Courier New"/>
+                <a:ea typeface="DejaVu Sans"/>
+              </a:rPr>
+              <a:t>special.how</a:t>
+            </a:r>
+            <a:r>
+              <a:rPr lang="en-US" sz="1800" b="1" strike="noStrike" spc="-1" dirty="0">
+                <a:solidFill>
+                  <a:srgbClr val="000000"/>
+                </a:solidFill>
+                <a:uFill>
+                  <a:solidFill>
+                    <a:srgbClr val="FFFFFF"/>
+                  </a:solidFill>
+                </a:uFill>
+                <a:latin typeface="Courier New"/>
+                <a:ea typeface="DejaVu Sans"/>
+              </a:rPr>
+              <a:t>=very</a:t>
+            </a:r>
+            <a:endParaRPr lang="en-US" sz="1800" b="0" strike="noStrike" spc="-1" dirty="0">
               <a:solidFill>
                 <a:srgbClr val="000000"/>
               </a:solidFill>
@@ -27274,7 +27514,7 @@
               </a:lnSpc>
             </a:pPr>
             <a:r>
-              <a:rPr lang="en-US" sz="1800" b="1" strike="noStrike" spc="-1">
+              <a:rPr lang="en-US" sz="1800" b="1" strike="noStrike" spc="-1" dirty="0">
                 <a:solidFill>
                   <a:srgbClr val="000000"/>
                 </a:solidFill>
@@ -27286,10 +27526,70 @@
                 <a:latin typeface="Courier New"/>
                 <a:ea typeface="DejaVu Sans"/>
               </a:rPr>
-              <a:t>$ kubectl create –f </a:t>
-            </a:r>
-            <a:r>
-              <a:rPr lang="en-US" sz="1800" b="1" strike="noStrike" spc="-1">
+              <a:t>$ </a:t>
+            </a:r>
+            <a:r>
+              <a:rPr lang="en-US" sz="1800" b="1" strike="noStrike" spc="-1" dirty="0" err="1">
+                <a:solidFill>
+                  <a:srgbClr val="000000"/>
+                </a:solidFill>
+                <a:uFill>
+                  <a:solidFill>
+                    <a:srgbClr val="FFFFFF"/>
+                  </a:solidFill>
+                </a:uFill>
+                <a:latin typeface="Courier New"/>
+                <a:ea typeface="DejaVu Sans"/>
+              </a:rPr>
+              <a:t>kubectl</a:t>
+            </a:r>
+            <a:r>
+              <a:rPr lang="en-US" sz="1800" b="1" strike="noStrike" spc="-1" dirty="0">
+                <a:solidFill>
+                  <a:srgbClr val="000000"/>
+                </a:solidFill>
+                <a:uFill>
+                  <a:solidFill>
+                    <a:srgbClr val="FFFFFF"/>
+                  </a:solidFill>
+                </a:uFill>
+                <a:latin typeface="Courier New"/>
+                <a:ea typeface="DejaVu Sans"/>
+              </a:rPr>
+              <a:t> </a:t>
+            </a:r>
+            <a:r>
+              <a:rPr lang="en-US" b="1" spc="-1" dirty="0">
+                <a:solidFill>
+                  <a:srgbClr val="000000"/>
+                </a:solidFill>
+                <a:uFill>
+                  <a:solidFill>
+                    <a:srgbClr val="FFFFFF"/>
+                  </a:solidFill>
+                </a:uFill>
+                <a:latin typeface="Courier New"/>
+                <a:ea typeface="DejaVu Sans"/>
+              </a:rPr>
+              <a:t>apply </a:t>
+            </a:r>
+            <a:r>
+              <a:rPr lang="en-US" sz="1800" b="1" strike="noStrike" spc="-1" dirty="0">
+                <a:solidFill>
+                  <a:srgbClr val="000000"/>
+                </a:solidFill>
+                <a:uFill>
+                  <a:solidFill>
+                    <a:srgbClr val="FFFFFF"/>
+                  </a:solidFill>
+                </a:uFill>
+                <a:latin typeface="Courier New"/>
+                <a:ea typeface="DejaVu Sans"/>
+              </a:rPr>
+              <a:t>–f </a:t>
+            </a:r>
+            <a:r>
+              <a:rPr lang="en-US" sz="1800" b="1" strike="noStrike" spc="-1" dirty="0">
                 <a:solidFill>
                   <a:srgbClr val="843C0B"/>
                 </a:solidFill>
@@ -27301,9 +27601,24 @@
                 <a:latin typeface="Courier New"/>
                 <a:ea typeface="DejaVu Sans"/>
               </a:rPr>
-              <a:t>my-secret.yaml</a:t>
-            </a:r>
-            <a:endParaRPr lang="en-US" sz="1800" b="0" strike="noStrike" spc="-1">
+              <a:t>my-</a:t>
+            </a:r>
+            <a:r>
+              <a:rPr lang="en-US" sz="1800" b="1" strike="noStrike" spc="-1" dirty="0" err="1">
+                <a:solidFill>
+                  <a:srgbClr val="843C0B"/>
+                </a:solidFill>
+                <a:uFill>
+                  <a:solidFill>
+                    <a:srgbClr val="FFFFFF"/>
+                  </a:solidFill>
+                </a:uFill>
+                <a:latin typeface="Courier New"/>
+                <a:ea typeface="DejaVu Sans"/>
+              </a:rPr>
+              <a:t>secret.yaml</a:t>
+            </a:r>
+            <a:endParaRPr lang="en-US" sz="1800" b="0" strike="noStrike" spc="-1" dirty="0">
               <a:solidFill>
                 <a:srgbClr val="000000"/>
               </a:solidFill>
@@ -27322,7 +27637,7 @@
               </a:lnSpc>
             </a:pPr>
             <a:r>
-              <a:rPr lang="en-US" sz="1800" b="1" strike="noStrike" spc="-1">
+              <a:rPr lang="en-US" sz="1800" b="1" strike="noStrike" spc="-1" dirty="0">
                 <a:solidFill>
                   <a:srgbClr val="000000"/>
                 </a:solidFill>
@@ -27334,9 +27649,69 @@
                 <a:latin typeface="Courier New"/>
                 <a:ea typeface="DejaVu Sans"/>
               </a:rPr>
-              <a:t>$ kubectl create secret generic mysecret --from-literal=username=admin --from-literal=password=1f2d1e2e67df </a:t>
-            </a:r>
-            <a:endParaRPr lang="en-US" sz="1800" b="0" strike="noStrike" spc="-1">
+              <a:t>$ </a:t>
+            </a:r>
+            <a:r>
+              <a:rPr lang="en-US" sz="1800" b="1" strike="noStrike" spc="-1" dirty="0" err="1">
+                <a:solidFill>
+                  <a:srgbClr val="000000"/>
+                </a:solidFill>
+                <a:uFill>
+                  <a:solidFill>
+                    <a:srgbClr val="FFFFFF"/>
+                  </a:solidFill>
+                </a:uFill>
+                <a:latin typeface="Courier New"/>
+                <a:ea typeface="DejaVu Sans"/>
+              </a:rPr>
+              <a:t>kubectl</a:t>
+            </a:r>
+            <a:r>
+              <a:rPr lang="en-US" sz="1800" b="1" strike="noStrike" spc="-1" dirty="0">
+                <a:solidFill>
+                  <a:srgbClr val="000000"/>
+                </a:solidFill>
+                <a:uFill>
+                  <a:solidFill>
+                    <a:srgbClr val="FFFFFF"/>
+                  </a:solidFill>
+                </a:uFill>
+                <a:latin typeface="Courier New"/>
+                <a:ea typeface="DejaVu Sans"/>
+              </a:rPr>
+              <a:t> create secret generic </a:t>
+            </a:r>
+            <a:r>
+              <a:rPr lang="en-US" sz="1800" b="1" strike="noStrike" spc="-1" dirty="0" err="1">
+                <a:solidFill>
+                  <a:srgbClr val="000000"/>
+                </a:solidFill>
+                <a:uFill>
+                  <a:solidFill>
+                    <a:srgbClr val="FFFFFF"/>
+                  </a:solidFill>
+                </a:uFill>
+                <a:latin typeface="Courier New"/>
+                <a:ea typeface="DejaVu Sans"/>
+              </a:rPr>
+              <a:t>mysecret</a:t>
+            </a:r>
+            <a:r>
+              <a:rPr lang="en-US" sz="1800" b="1" strike="noStrike" spc="-1" dirty="0">
+                <a:solidFill>
+                  <a:srgbClr val="000000"/>
+                </a:solidFill>
+                <a:uFill>
+                  <a:solidFill>
+                    <a:srgbClr val="FFFFFF"/>
+                  </a:solidFill>
+                </a:uFill>
+                <a:latin typeface="Courier New"/>
+                <a:ea typeface="DejaVu Sans"/>
+              </a:rPr>
+              <a:t> --from-literal=username=admin --from-literal=password=1f2d1e2e67df </a:t>
+            </a:r>
+            <a:endParaRPr lang="en-US" sz="1800" b="0" strike="noStrike" spc="-1" dirty="0">
               <a:solidFill>
                 <a:srgbClr val="000000"/>
               </a:solidFill>

</xml_diff>